<commit_message>
updated the slides on metaclass
</commit_message>
<xml_diff>
--- a/semaine7/CO12AL-W7-VIDEO02-SLIDE01.pptx
+++ b/semaine7/CO12AL-W7-VIDEO02-SLIDE01.pptx
@@ -1233,11 +1233,7 @@
             </a:pPr>
             <a:r>
               <a:rPr lang="fr-FR" dirty="0" smtClean="0"/>
-              <a:t>Il </a:t>
-            </a:r>
-            <a:r>
-              <a:rPr lang="fr-FR" dirty="0" smtClean="0"/>
-              <a:t>faut faire la distinction entre la syntaxe</a:t>
+              <a:t>Il faut faire la distinction entre la syntaxe</a:t>
             </a:r>
             <a:r>
               <a:rPr lang="fr-FR" baseline="0" dirty="0" smtClean="0"/>
@@ -1288,19 +1284,7 @@
             </a:pPr>
             <a:r>
               <a:rPr lang="fr-FR" baseline="0" dirty="0" smtClean="0"/>
-              <a:t>La concept de décorateur est </a:t>
-            </a:r>
-            <a:r>
-              <a:rPr lang="fr-FR" baseline="0" dirty="0" smtClean="0"/>
-              <a:t>complexe </a:t>
-            </a:r>
-            <a:r>
-              <a:rPr lang="fr-FR" baseline="0" dirty="0" smtClean="0"/>
-              <a:t>et très </a:t>
-            </a:r>
-            <a:r>
-              <a:rPr lang="fr-FR" baseline="0" dirty="0" smtClean="0"/>
-              <a:t>puissant puisque l’on peut implémenter ses propres décorateurs. </a:t>
+              <a:t>La concept de décorateur est complexe et très puissant puisque l’on peut implémenter ses propres décorateurs. </a:t>
             </a:r>
           </a:p>
         </p:txBody>
@@ -1658,11 +1642,7 @@
             </a:pPr>
             <a:r>
               <a:rPr lang="fr-FR" dirty="0" smtClean="0"/>
-              <a:t>Si </a:t>
-            </a:r>
-            <a:r>
-              <a:rPr lang="fr-FR" dirty="0" smtClean="0"/>
-              <a:t>le décorateur est une fonction,</a:t>
+              <a:t>Si le décorateur est une fonction,</a:t>
             </a:r>
             <a:r>
               <a:rPr lang="fr-FR" baseline="0" dirty="0" smtClean="0"/>
@@ -7534,46 +7514,31 @@
               <a:buNone/>
             </a:pPr>
             <a:r>
-              <a:rPr lang="fr-FR" sz="4000" dirty="0">
-                <a:solidFill>
-                  <a:srgbClr val="3333CC"/>
-                </a:solidFill>
+              <a:rPr lang="fr-FR" sz="4400" dirty="0">
                 <a:cs typeface="Courier New" panose="02070309020205020404" pitchFamily="49" charset="0"/>
               </a:rPr>
               <a:t>C</a:t>
             </a:r>
             <a:r>
-              <a:rPr lang="fr-FR" sz="4000" dirty="0" smtClean="0">
-                <a:solidFill>
-                  <a:srgbClr val="3333CC"/>
-                </a:solidFill>
+              <a:rPr lang="fr-FR" sz="4400" dirty="0" smtClean="0">
                 <a:cs typeface="Courier New" panose="02070309020205020404" pitchFamily="49" charset="0"/>
               </a:rPr>
               <a:t>’est </a:t>
             </a:r>
             <a:r>
-              <a:rPr lang="fr-FR" sz="4000" dirty="0">
-                <a:solidFill>
-                  <a:srgbClr val="3333CC"/>
-                </a:solidFill>
+              <a:rPr lang="fr-FR" sz="4400" dirty="0">
                 <a:cs typeface="Courier New" panose="02070309020205020404" pitchFamily="49" charset="0"/>
               </a:rPr>
               <a:t>quoi un </a:t>
             </a:r>
             <a:r>
-              <a:rPr lang="fr-FR" sz="4000" i="1" dirty="0" err="1">
-                <a:solidFill>
-                  <a:srgbClr val="3333CC"/>
-                </a:solidFill>
+              <a:rPr lang="fr-FR" sz="4400" i="1" dirty="0" err="1">
                 <a:cs typeface="Courier New" panose="02070309020205020404" pitchFamily="49" charset="0"/>
               </a:rPr>
               <a:t>callable</a:t>
             </a:r>
             <a:r>
-              <a:rPr lang="fr-FR" sz="4000" dirty="0">
-                <a:solidFill>
-                  <a:srgbClr val="3333CC"/>
-                </a:solidFill>
+              <a:rPr lang="fr-FR" sz="4400" dirty="0">
                 <a:cs typeface="Courier New" panose="02070309020205020404" pitchFamily="49" charset="0"/>
               </a:rPr>
               <a:t> ?</a:t>
@@ -7656,10 +7621,7 @@
               <a:buNone/>
             </a:pPr>
             <a:r>
-              <a:rPr lang="fr-FR" sz="4000" dirty="0" smtClean="0">
-                <a:solidFill>
-                  <a:srgbClr val="3333CC"/>
-                </a:solidFill>
+              <a:rPr lang="fr-FR" sz="4400" dirty="0" smtClean="0">
                 <a:cs typeface="Courier New" panose="02070309020205020404" pitchFamily="49" charset="0"/>
               </a:rPr>
               <a:t>C’est quoi un décorateur ?</a:t>
@@ -7946,10 +7908,6 @@
               </a:rPr>
               <a:t>(f)(a, b)</a:t>
             </a:r>
-            <a:endParaRPr lang="fr-FR" sz="4000" dirty="0">
-              <a:latin typeface="Courier New" panose="02070309020205020404" pitchFamily="49" charset="0"/>
-              <a:cs typeface="Courier New" panose="02070309020205020404" pitchFamily="49" charset="0"/>
-            </a:endParaRPr>
           </a:p>
         </p:txBody>
       </p:sp>
@@ -8551,14 +8509,20 @@
               <a:buNone/>
             </a:pPr>
             <a:r>
-              <a:rPr lang="fr-FR" sz="4000" dirty="0" smtClean="0">
-                <a:solidFill>
-                  <a:srgbClr val="3333CC"/>
-                </a:solidFill>
-                <a:cs typeface="Courier New" panose="02070309020205020404" pitchFamily="49" charset="0"/>
-              </a:rPr>
-              <a:t>Comment implémenter un décorateur en pratique ? </a:t>
-            </a:r>
+              <a:rPr lang="fr-FR" sz="4400" dirty="0" smtClean="0">
+                <a:cs typeface="Courier New" panose="02070309020205020404" pitchFamily="49" charset="0"/>
+              </a:rPr>
+              <a:t>Comment implémenter un décorateur </a:t>
+            </a:r>
+            <a:r>
+              <a:rPr lang="fr-FR" sz="4400" dirty="0" smtClean="0">
+                <a:cs typeface="Courier New" panose="02070309020205020404" pitchFamily="49" charset="0"/>
+              </a:rPr>
+              <a:t>? </a:t>
+            </a:r>
+            <a:endParaRPr lang="fr-FR" sz="4400" dirty="0" smtClean="0">
+              <a:cs typeface="Courier New" panose="02070309020205020404" pitchFamily="49" charset="0"/>
+            </a:endParaRPr>
           </a:p>
           <a:p>
             <a:pPr marL="0" indent="0">
@@ -8568,61 +8532,43 @@
               <a:rPr lang="fr-FR" sz="3600" dirty="0" smtClean="0">
                 <a:cs typeface="Courier New" panose="02070309020205020404" pitchFamily="49" charset="0"/>
               </a:rPr>
-              <a:t>Soit une </a:t>
+              <a:t>Soit une fonction </a:t>
+            </a:r>
+            <a:r>
+              <a:rPr lang="fr-FR" sz="3600" dirty="0" err="1" smtClean="0">
+                <a:latin typeface="Courier New" panose="02070309020205020404" pitchFamily="49" charset="0"/>
+                <a:cs typeface="Courier New" panose="02070309020205020404" pitchFamily="49" charset="0"/>
+              </a:rPr>
+              <a:t>decorateur</a:t>
             </a:r>
             <a:r>
               <a:rPr lang="fr-FR" sz="3600" dirty="0" smtClean="0">
                 <a:cs typeface="Courier New" panose="02070309020205020404" pitchFamily="49" charset="0"/>
               </a:rPr>
-              <a:t>fonction </a:t>
-            </a:r>
-            <a:r>
-              <a:rPr lang="fr-FR" sz="3600" dirty="0" err="1" smtClean="0">
-                <a:latin typeface="Courier New" panose="02070309020205020404" pitchFamily="49" charset="0"/>
-                <a:cs typeface="Courier New" panose="02070309020205020404" pitchFamily="49" charset="0"/>
-              </a:rPr>
-              <a:t>decorateur</a:t>
-            </a:r>
+              <a:t> qui prend comme argument une fonction et retourne une fonction</a:t>
+            </a:r>
+          </a:p>
+          <a:p>
+            <a:pPr marL="0" indent="0">
+              <a:buNone/>
+            </a:pPr>
             <a:r>
               <a:rPr lang="fr-FR" sz="3600" dirty="0" smtClean="0">
                 <a:cs typeface="Courier New" panose="02070309020205020404" pitchFamily="49" charset="0"/>
               </a:rPr>
-              <a:t> qui prend comme argument une fonction et retourne une </a:t>
+              <a:t>Soit </a:t>
+            </a:r>
+            <a:r>
+              <a:rPr lang="fr-FR" sz="3600" dirty="0">
+                <a:cs typeface="Courier New" panose="02070309020205020404" pitchFamily="49" charset="0"/>
+              </a:rPr>
+              <a:t>u</a:t>
             </a:r>
             <a:r>
               <a:rPr lang="fr-FR" sz="3600" dirty="0" smtClean="0">
                 <a:cs typeface="Courier New" panose="02070309020205020404" pitchFamily="49" charset="0"/>
               </a:rPr>
-              <a:t>fonction</a:t>
-            </a:r>
-          </a:p>
-          <a:p>
-            <a:pPr marL="0" indent="0">
-              <a:buNone/>
-            </a:pPr>
-            <a:r>
-              <a:rPr lang="fr-FR" sz="3600" dirty="0" smtClean="0">
-                <a:cs typeface="Courier New" panose="02070309020205020404" pitchFamily="49" charset="0"/>
-              </a:rPr>
-              <a:t>Soit </a:t>
-            </a:r>
-            <a:r>
-              <a:rPr lang="fr-FR" sz="3600" dirty="0">
-                <a:cs typeface="Courier New" panose="02070309020205020404" pitchFamily="49" charset="0"/>
-              </a:rPr>
-              <a:t>u</a:t>
-            </a:r>
-            <a:r>
-              <a:rPr lang="fr-FR" sz="3600" dirty="0" smtClean="0">
-                <a:cs typeface="Courier New" panose="02070309020205020404" pitchFamily="49" charset="0"/>
-              </a:rPr>
-              <a:t>ne </a:t>
-            </a:r>
-            <a:r>
-              <a:rPr lang="fr-FR" sz="3600" dirty="0" smtClean="0">
-                <a:cs typeface="Courier New" panose="02070309020205020404" pitchFamily="49" charset="0"/>
-              </a:rPr>
-              <a:t>classe </a:t>
+              <a:t>ne classe </a:t>
             </a:r>
             <a:r>
               <a:rPr lang="fr-FR" sz="3600" dirty="0" err="1" smtClean="0">
@@ -9362,10 +9308,7 @@
               <a:buNone/>
             </a:pPr>
             <a:r>
-              <a:rPr lang="fr-FR" sz="4000" dirty="0" smtClean="0">
-                <a:solidFill>
-                  <a:srgbClr val="3333CC"/>
-                </a:solidFill>
+              <a:rPr lang="fr-FR" sz="4400" dirty="0" smtClean="0">
                 <a:cs typeface="Courier New" panose="02070309020205020404" pitchFamily="49" charset="0"/>
               </a:rPr>
               <a:t>On peut également décorer les classes</a:t>
@@ -9395,7 +9338,7 @@
         </p:nvSpPr>
         <p:spPr>
           <a:xfrm>
-            <a:off x="243444" y="3082121"/>
+            <a:off x="212964" y="3405277"/>
             <a:ext cx="7362962" cy="2862322"/>
           </a:xfrm>
           <a:prstGeom prst="rect">
@@ -9440,21 +9383,7 @@
                 <a:latin typeface="Courier New" panose="02070309020205020404" pitchFamily="49" charset="0"/>
                 <a:cs typeface="Courier New" panose="02070309020205020404" pitchFamily="49" charset="0"/>
               </a:rPr>
-              <a:t>class  </a:t>
-            </a:r>
-            <a:r>
-              <a:rPr lang="fr-FR" sz="3600" dirty="0" smtClean="0">
-                <a:latin typeface="Courier New" panose="02070309020205020404" pitchFamily="49" charset="0"/>
-                <a:cs typeface="Courier New" panose="02070309020205020404" pitchFamily="49" charset="0"/>
-              </a:rPr>
-              <a:t>C</a:t>
-            </a:r>
-            <a:r>
-              <a:rPr lang="fr-FR" sz="3600" dirty="0" smtClean="0">
-                <a:latin typeface="Courier New" panose="02070309020205020404" pitchFamily="49" charset="0"/>
-                <a:cs typeface="Courier New" panose="02070309020205020404" pitchFamily="49" charset="0"/>
-              </a:rPr>
-              <a:t>:</a:t>
+              <a:t>class  C:</a:t>
             </a:r>
             <a:endParaRPr lang="fr-FR" sz="3600" dirty="0">
               <a:latin typeface="Courier New" panose="02070309020205020404" pitchFamily="49" charset="0"/>
@@ -9544,7 +9473,7 @@
         </p:nvSpPr>
         <p:spPr>
           <a:xfrm>
-            <a:off x="7606406" y="3082121"/>
+            <a:off x="7575926" y="3405277"/>
             <a:ext cx="7132320" cy="1754326"/>
           </a:xfrm>
           <a:prstGeom prst="rect">
@@ -9568,10 +9497,6 @@
               </a:rPr>
               <a:t>C(1)</a:t>
             </a:r>
-            <a:endParaRPr lang="fr-FR" sz="3600" dirty="0" smtClean="0">
-              <a:latin typeface="Courier New" panose="02070309020205020404" pitchFamily="49" charset="0"/>
-              <a:cs typeface="Courier New" panose="02070309020205020404" pitchFamily="49" charset="0"/>
-            </a:endParaRPr>
           </a:p>
           <a:p>
             <a:pPr marL="0" indent="0">
@@ -9642,7 +9567,7 @@
         </p:nvCxnSpPr>
         <p:spPr bwMode="auto">
           <a:xfrm flipH="1">
-            <a:off x="7595115" y="3082121"/>
+            <a:off x="7564635" y="3405277"/>
             <a:ext cx="11291" cy="1851377"/>
           </a:xfrm>
           <a:prstGeom prst="line">

</xml_diff>

<commit_message>
updated slides according to Thierry's comments
</commit_message>
<xml_diff>
--- a/semaine7/CO12AL-W7-VIDEO02-SLIDE01.pptx
+++ b/semaine7/CO12AL-W7-VIDEO02-SLIDE01.pptx
@@ -5,10 +5,10 @@
     <p:sldMasterId id="2147483649" r:id="rId1"/>
   </p:sldMasterIdLst>
   <p:notesMasterIdLst>
-    <p:notesMasterId r:id="rId12"/>
+    <p:notesMasterId r:id="rId13"/>
   </p:notesMasterIdLst>
   <p:handoutMasterIdLst>
-    <p:handoutMasterId r:id="rId13"/>
+    <p:handoutMasterId r:id="rId14"/>
   </p:handoutMasterIdLst>
   <p:sldIdLst>
     <p:sldId id="900" r:id="rId2"/>
@@ -20,7 +20,8 @@
     <p:sldId id="913" r:id="rId8"/>
     <p:sldId id="914" r:id="rId9"/>
     <p:sldId id="918" r:id="rId10"/>
-    <p:sldId id="920" r:id="rId11"/>
+    <p:sldId id="921" r:id="rId11"/>
+    <p:sldId id="920" r:id="rId12"/>
   </p:sldIdLst>
   <p:sldSz cx="12192000" cy="6858000"/>
   <p:notesSz cx="7099300" cy="10234613"/>
@@ -163,6 +164,7 @@
             <p14:sldId id="913"/>
             <p14:sldId id="914"/>
             <p14:sldId id="918"/>
+            <p14:sldId id="921"/>
             <p14:sldId id="920"/>
           </p14:sldIdLst>
         </p14:section>
@@ -2329,7 +2331,7 @@
               <a:pPr>
                 <a:defRPr/>
               </a:pPr>
-              <a:t>10</a:t>
+              <a:t>11</a:t>
             </a:fld>
             <a:endParaRPr lang="en-US"/>
           </a:p>
@@ -6465,6 +6467,695 @@
 </file>
 
 <file path=ppt/slides/slide10.xml><?xml version="1.0" encoding="utf-8"?>
+<p:sld xmlns:a="http://schemas.openxmlformats.org/drawingml/2006/main" xmlns:r="http://schemas.openxmlformats.org/officeDocument/2006/relationships" xmlns:p="http://schemas.openxmlformats.org/presentationml/2006/main">
+  <p:cSld>
+    <p:spTree>
+      <p:nvGrpSpPr>
+        <p:cNvPr id="1" name=""/>
+        <p:cNvGrpSpPr/>
+        <p:nvPr/>
+      </p:nvGrpSpPr>
+      <p:grpSpPr>
+        <a:xfrm>
+          <a:off x="0" y="0"/>
+          <a:ext cx="0" cy="0"/>
+          <a:chOff x="0" y="0"/>
+          <a:chExt cx="0" cy="0"/>
+        </a:xfrm>
+      </p:grpSpPr>
+      <p:sp>
+        <p:nvSpPr>
+          <p:cNvPr id="4" name="ZoneTexte 3"/>
+          <p:cNvSpPr txBox="1"/>
+          <p:nvPr/>
+        </p:nvSpPr>
+        <p:spPr>
+          <a:xfrm>
+            <a:off x="879231" y="527538"/>
+            <a:ext cx="8176846" cy="5262979"/>
+          </a:xfrm>
+          <a:prstGeom prst="rect">
+            <a:avLst/>
+          </a:prstGeom>
+          <a:noFill/>
+        </p:spPr>
+        <p:txBody>
+          <a:bodyPr wrap="square" rtlCol="0">
+            <a:spAutoFit/>
+          </a:bodyPr>
+          <a:lstStyle/>
+          <a:p>
+            <a:r>
+              <a:rPr lang="fr-FR" dirty="0">
+                <a:latin typeface="Courier New" panose="02070309020205020404" pitchFamily="49" charset="0"/>
+                <a:cs typeface="Courier New" panose="02070309020205020404" pitchFamily="49" charset="0"/>
+              </a:rPr>
+              <a:t>&gt;&gt;&gt; f(1, 2)</a:t>
+            </a:r>
+          </a:p>
+          <a:p>
+            <a:r>
+              <a:rPr lang="fr-FR" dirty="0">
+                <a:latin typeface="Courier New" panose="02070309020205020404" pitchFamily="49" charset="0"/>
+                <a:cs typeface="Courier New" panose="02070309020205020404" pitchFamily="49" charset="0"/>
+              </a:rPr>
+              <a:t>f : 1 appels</a:t>
+            </a:r>
+          </a:p>
+          <a:p>
+            <a:r>
+              <a:rPr lang="fr-FR" dirty="0">
+                <a:latin typeface="Courier New" panose="02070309020205020404" pitchFamily="49" charset="0"/>
+                <a:cs typeface="Courier New" panose="02070309020205020404" pitchFamily="49" charset="0"/>
+              </a:rPr>
+              <a:t>1 2</a:t>
+            </a:r>
+          </a:p>
+          <a:p>
+            <a:r>
+              <a:rPr lang="fr-FR" dirty="0">
+                <a:latin typeface="Courier New" panose="02070309020205020404" pitchFamily="49" charset="0"/>
+                <a:cs typeface="Courier New" panose="02070309020205020404" pitchFamily="49" charset="0"/>
+              </a:rPr>
+              <a:t>&gt;&gt;&gt; f(3, 'a')</a:t>
+            </a:r>
+          </a:p>
+          <a:p>
+            <a:r>
+              <a:rPr lang="fr-FR" dirty="0">
+                <a:latin typeface="Courier New" panose="02070309020205020404" pitchFamily="49" charset="0"/>
+                <a:cs typeface="Courier New" panose="02070309020205020404" pitchFamily="49" charset="0"/>
+              </a:rPr>
+              <a:t>f : 2 appels</a:t>
+            </a:r>
+          </a:p>
+          <a:p>
+            <a:r>
+              <a:rPr lang="fr-FR" dirty="0">
+                <a:latin typeface="Courier New" panose="02070309020205020404" pitchFamily="49" charset="0"/>
+                <a:cs typeface="Courier New" panose="02070309020205020404" pitchFamily="49" charset="0"/>
+              </a:rPr>
+              <a:t>3 </a:t>
+            </a:r>
+            <a:r>
+              <a:rPr lang="fr-FR" dirty="0" smtClean="0">
+                <a:latin typeface="Courier New" panose="02070309020205020404" pitchFamily="49" charset="0"/>
+                <a:cs typeface="Courier New" panose="02070309020205020404" pitchFamily="49" charset="0"/>
+              </a:rPr>
+              <a:t>a</a:t>
+            </a:r>
+          </a:p>
+          <a:p>
+            <a:endParaRPr lang="fr-FR" dirty="0">
+              <a:latin typeface="Courier New" panose="02070309020205020404" pitchFamily="49" charset="0"/>
+              <a:cs typeface="Courier New" panose="02070309020205020404" pitchFamily="49" charset="0"/>
+            </a:endParaRPr>
+          </a:p>
+          <a:p>
+            <a:r>
+              <a:rPr lang="fr-FR" dirty="0">
+                <a:latin typeface="Courier New" panose="02070309020205020404" pitchFamily="49" charset="0"/>
+                <a:cs typeface="Courier New" panose="02070309020205020404" pitchFamily="49" charset="0"/>
+              </a:rPr>
+              <a:t>&gt;&gt;&gt; @</a:t>
+            </a:r>
+            <a:r>
+              <a:rPr lang="fr-FR" dirty="0" err="1">
+                <a:latin typeface="Courier New" panose="02070309020205020404" pitchFamily="49" charset="0"/>
+                <a:cs typeface="Courier New" panose="02070309020205020404" pitchFamily="49" charset="0"/>
+              </a:rPr>
+              <a:t>NbAppel</a:t>
+            </a:r>
+            <a:endParaRPr lang="fr-FR" dirty="0">
+              <a:latin typeface="Courier New" panose="02070309020205020404" pitchFamily="49" charset="0"/>
+              <a:cs typeface="Courier New" panose="02070309020205020404" pitchFamily="49" charset="0"/>
+            </a:endParaRPr>
+          </a:p>
+          <a:p>
+            <a:r>
+              <a:rPr lang="fr-FR" dirty="0" err="1">
+                <a:latin typeface="Courier New" panose="02070309020205020404" pitchFamily="49" charset="0"/>
+                <a:cs typeface="Courier New" panose="02070309020205020404" pitchFamily="49" charset="0"/>
+              </a:rPr>
+              <a:t>def</a:t>
+            </a:r>
+            <a:r>
+              <a:rPr lang="fr-FR" dirty="0">
+                <a:latin typeface="Courier New" panose="02070309020205020404" pitchFamily="49" charset="0"/>
+                <a:cs typeface="Courier New" panose="02070309020205020404" pitchFamily="49" charset="0"/>
+              </a:rPr>
+              <a:t> g(a, b, c):</a:t>
+            </a:r>
+          </a:p>
+          <a:p>
+            <a:r>
+              <a:rPr lang="fr-FR" dirty="0">
+                <a:latin typeface="Courier New" panose="02070309020205020404" pitchFamily="49" charset="0"/>
+                <a:cs typeface="Courier New" panose="02070309020205020404" pitchFamily="49" charset="0"/>
+              </a:rPr>
+              <a:t>	</a:t>
+            </a:r>
+            <a:r>
+              <a:rPr lang="fr-FR" dirty="0" err="1">
+                <a:latin typeface="Courier New" panose="02070309020205020404" pitchFamily="49" charset="0"/>
+                <a:cs typeface="Courier New" panose="02070309020205020404" pitchFamily="49" charset="0"/>
+              </a:rPr>
+              <a:t>print</a:t>
+            </a:r>
+            <a:r>
+              <a:rPr lang="fr-FR" dirty="0">
+                <a:latin typeface="Courier New" panose="02070309020205020404" pitchFamily="49" charset="0"/>
+                <a:cs typeface="Courier New" panose="02070309020205020404" pitchFamily="49" charset="0"/>
+              </a:rPr>
+              <a:t> a, b, c</a:t>
+            </a:r>
+          </a:p>
+          <a:p>
+            <a:r>
+              <a:rPr lang="fr-FR" dirty="0">
+                <a:latin typeface="Courier New" panose="02070309020205020404" pitchFamily="49" charset="0"/>
+                <a:cs typeface="Courier New" panose="02070309020205020404" pitchFamily="49" charset="0"/>
+              </a:rPr>
+              <a:t>	</a:t>
+            </a:r>
+          </a:p>
+          <a:p>
+            <a:r>
+              <a:rPr lang="fr-FR" dirty="0">
+                <a:latin typeface="Courier New" panose="02070309020205020404" pitchFamily="49" charset="0"/>
+                <a:cs typeface="Courier New" panose="02070309020205020404" pitchFamily="49" charset="0"/>
+              </a:rPr>
+              <a:t>&gt;&gt;&gt; g(1, 2, 3)</a:t>
+            </a:r>
+          </a:p>
+          <a:p>
+            <a:r>
+              <a:rPr lang="fr-FR" dirty="0">
+                <a:latin typeface="Courier New" panose="02070309020205020404" pitchFamily="49" charset="0"/>
+                <a:cs typeface="Courier New" panose="02070309020205020404" pitchFamily="49" charset="0"/>
+              </a:rPr>
+              <a:t>g : 1 appels</a:t>
+            </a:r>
+          </a:p>
+          <a:p>
+            <a:r>
+              <a:rPr lang="fr-FR" dirty="0">
+                <a:latin typeface="Courier New" panose="02070309020205020404" pitchFamily="49" charset="0"/>
+                <a:cs typeface="Courier New" panose="02070309020205020404" pitchFamily="49" charset="0"/>
+              </a:rPr>
+              <a:t>1 2 3</a:t>
+            </a:r>
+          </a:p>
+        </p:txBody>
+      </p:sp>
+    </p:spTree>
+    <p:extLst>
+      <p:ext uri="{BB962C8B-B14F-4D97-AF65-F5344CB8AC3E}">
+        <p14:creationId xmlns:p14="http://schemas.microsoft.com/office/powerpoint/2010/main" val="3249063087"/>
+      </p:ext>
+    </p:extLst>
+  </p:cSld>
+  <p:clrMapOvr>
+    <a:masterClrMapping/>
+  </p:clrMapOvr>
+  <p:timing>
+    <p:tnLst>
+      <p:par>
+        <p:cTn id="1" dur="indefinite" restart="never" nodeType="tmRoot">
+          <p:childTnLst>
+            <p:seq concurrent="1" nextAc="seek">
+              <p:cTn id="2" dur="indefinite" nodeType="mainSeq">
+                <p:childTnLst>
+                  <p:par>
+                    <p:cTn id="3" fill="hold">
+                      <p:stCondLst>
+                        <p:cond delay="indefinite"/>
+                      </p:stCondLst>
+                      <p:childTnLst>
+                        <p:par>
+                          <p:cTn id="4" fill="hold">
+                            <p:stCondLst>
+                              <p:cond delay="0"/>
+                            </p:stCondLst>
+                            <p:childTnLst>
+                              <p:par>
+                                <p:cTn id="5" presetID="1" presetClass="entr" presetSubtype="0" fill="hold" nodeType="clickEffect">
+                                  <p:stCondLst>
+                                    <p:cond delay="0"/>
+                                  </p:stCondLst>
+                                  <p:childTnLst>
+                                    <p:set>
+                                      <p:cBhvr>
+                                        <p:cTn id="6" dur="1" fill="hold">
+                                          <p:stCondLst>
+                                            <p:cond delay="0"/>
+                                          </p:stCondLst>
+                                        </p:cTn>
+                                        <p:tgtEl>
+                                          <p:spTgt spid="4">
+                                            <p:txEl>
+                                              <p:pRg st="0" end="0"/>
+                                            </p:txEl>
+                                          </p:spTgt>
+                                        </p:tgtEl>
+                                        <p:attrNameLst>
+                                          <p:attrName>style.visibility</p:attrName>
+                                        </p:attrNameLst>
+                                      </p:cBhvr>
+                                      <p:to>
+                                        <p:strVal val="visible"/>
+                                      </p:to>
+                                    </p:set>
+                                  </p:childTnLst>
+                                </p:cTn>
+                              </p:par>
+                              <p:par>
+                                <p:cTn id="7" presetID="1" presetClass="entr" presetSubtype="0" fill="hold" nodeType="withEffect">
+                                  <p:stCondLst>
+                                    <p:cond delay="0"/>
+                                  </p:stCondLst>
+                                  <p:childTnLst>
+                                    <p:set>
+                                      <p:cBhvr>
+                                        <p:cTn id="8" dur="1" fill="hold">
+                                          <p:stCondLst>
+                                            <p:cond delay="0"/>
+                                          </p:stCondLst>
+                                        </p:cTn>
+                                        <p:tgtEl>
+                                          <p:spTgt spid="4">
+                                            <p:txEl>
+                                              <p:pRg st="1" end="1"/>
+                                            </p:txEl>
+                                          </p:spTgt>
+                                        </p:tgtEl>
+                                        <p:attrNameLst>
+                                          <p:attrName>style.visibility</p:attrName>
+                                        </p:attrNameLst>
+                                      </p:cBhvr>
+                                      <p:to>
+                                        <p:strVal val="visible"/>
+                                      </p:to>
+                                    </p:set>
+                                  </p:childTnLst>
+                                </p:cTn>
+                              </p:par>
+                              <p:par>
+                                <p:cTn id="9" presetID="1" presetClass="entr" presetSubtype="0" fill="hold" nodeType="withEffect">
+                                  <p:stCondLst>
+                                    <p:cond delay="0"/>
+                                  </p:stCondLst>
+                                  <p:childTnLst>
+                                    <p:set>
+                                      <p:cBhvr>
+                                        <p:cTn id="10" dur="1" fill="hold">
+                                          <p:stCondLst>
+                                            <p:cond delay="0"/>
+                                          </p:stCondLst>
+                                        </p:cTn>
+                                        <p:tgtEl>
+                                          <p:spTgt spid="4">
+                                            <p:txEl>
+                                              <p:pRg st="2" end="2"/>
+                                            </p:txEl>
+                                          </p:spTgt>
+                                        </p:tgtEl>
+                                        <p:attrNameLst>
+                                          <p:attrName>style.visibility</p:attrName>
+                                        </p:attrNameLst>
+                                      </p:cBhvr>
+                                      <p:to>
+                                        <p:strVal val="visible"/>
+                                      </p:to>
+                                    </p:set>
+                                  </p:childTnLst>
+                                </p:cTn>
+                              </p:par>
+                            </p:childTnLst>
+                          </p:cTn>
+                        </p:par>
+                      </p:childTnLst>
+                    </p:cTn>
+                  </p:par>
+                  <p:par>
+                    <p:cTn id="11" fill="hold">
+                      <p:stCondLst>
+                        <p:cond delay="indefinite"/>
+                      </p:stCondLst>
+                      <p:childTnLst>
+                        <p:par>
+                          <p:cTn id="12" fill="hold">
+                            <p:stCondLst>
+                              <p:cond delay="0"/>
+                            </p:stCondLst>
+                            <p:childTnLst>
+                              <p:par>
+                                <p:cTn id="13" presetID="1" presetClass="entr" presetSubtype="0" fill="hold" nodeType="clickEffect">
+                                  <p:stCondLst>
+                                    <p:cond delay="0"/>
+                                  </p:stCondLst>
+                                  <p:childTnLst>
+                                    <p:set>
+                                      <p:cBhvr>
+                                        <p:cTn id="14" dur="1" fill="hold">
+                                          <p:stCondLst>
+                                            <p:cond delay="0"/>
+                                          </p:stCondLst>
+                                        </p:cTn>
+                                        <p:tgtEl>
+                                          <p:spTgt spid="4">
+                                            <p:txEl>
+                                              <p:pRg st="3" end="3"/>
+                                            </p:txEl>
+                                          </p:spTgt>
+                                        </p:tgtEl>
+                                        <p:attrNameLst>
+                                          <p:attrName>style.visibility</p:attrName>
+                                        </p:attrNameLst>
+                                      </p:cBhvr>
+                                      <p:to>
+                                        <p:strVal val="visible"/>
+                                      </p:to>
+                                    </p:set>
+                                  </p:childTnLst>
+                                </p:cTn>
+                              </p:par>
+                              <p:par>
+                                <p:cTn id="15" presetID="1" presetClass="entr" presetSubtype="0" fill="hold" nodeType="withEffect">
+                                  <p:stCondLst>
+                                    <p:cond delay="0"/>
+                                  </p:stCondLst>
+                                  <p:childTnLst>
+                                    <p:set>
+                                      <p:cBhvr>
+                                        <p:cTn id="16" dur="1" fill="hold">
+                                          <p:stCondLst>
+                                            <p:cond delay="0"/>
+                                          </p:stCondLst>
+                                        </p:cTn>
+                                        <p:tgtEl>
+                                          <p:spTgt spid="4">
+                                            <p:txEl>
+                                              <p:pRg st="4" end="4"/>
+                                            </p:txEl>
+                                          </p:spTgt>
+                                        </p:tgtEl>
+                                        <p:attrNameLst>
+                                          <p:attrName>style.visibility</p:attrName>
+                                        </p:attrNameLst>
+                                      </p:cBhvr>
+                                      <p:to>
+                                        <p:strVal val="visible"/>
+                                      </p:to>
+                                    </p:set>
+                                  </p:childTnLst>
+                                </p:cTn>
+                              </p:par>
+                              <p:par>
+                                <p:cTn id="17" presetID="1" presetClass="entr" presetSubtype="0" fill="hold" nodeType="withEffect">
+                                  <p:stCondLst>
+                                    <p:cond delay="0"/>
+                                  </p:stCondLst>
+                                  <p:childTnLst>
+                                    <p:set>
+                                      <p:cBhvr>
+                                        <p:cTn id="18" dur="1" fill="hold">
+                                          <p:stCondLst>
+                                            <p:cond delay="0"/>
+                                          </p:stCondLst>
+                                        </p:cTn>
+                                        <p:tgtEl>
+                                          <p:spTgt spid="4">
+                                            <p:txEl>
+                                              <p:pRg st="5" end="5"/>
+                                            </p:txEl>
+                                          </p:spTgt>
+                                        </p:tgtEl>
+                                        <p:attrNameLst>
+                                          <p:attrName>style.visibility</p:attrName>
+                                        </p:attrNameLst>
+                                      </p:cBhvr>
+                                      <p:to>
+                                        <p:strVal val="visible"/>
+                                      </p:to>
+                                    </p:set>
+                                  </p:childTnLst>
+                                </p:cTn>
+                              </p:par>
+                            </p:childTnLst>
+                          </p:cTn>
+                        </p:par>
+                      </p:childTnLst>
+                    </p:cTn>
+                  </p:par>
+                  <p:par>
+                    <p:cTn id="19" fill="hold">
+                      <p:stCondLst>
+                        <p:cond delay="indefinite"/>
+                      </p:stCondLst>
+                      <p:childTnLst>
+                        <p:par>
+                          <p:cTn id="20" fill="hold">
+                            <p:stCondLst>
+                              <p:cond delay="0"/>
+                            </p:stCondLst>
+                            <p:childTnLst>
+                              <p:par>
+                                <p:cTn id="21" presetID="1" presetClass="entr" presetSubtype="0" fill="hold" nodeType="clickEffect">
+                                  <p:stCondLst>
+                                    <p:cond delay="0"/>
+                                  </p:stCondLst>
+                                  <p:childTnLst>
+                                    <p:set>
+                                      <p:cBhvr>
+                                        <p:cTn id="22" dur="1" fill="hold">
+                                          <p:stCondLst>
+                                            <p:cond delay="0"/>
+                                          </p:stCondLst>
+                                        </p:cTn>
+                                        <p:tgtEl>
+                                          <p:spTgt spid="4">
+                                            <p:txEl>
+                                              <p:pRg st="7" end="7"/>
+                                            </p:txEl>
+                                          </p:spTgt>
+                                        </p:tgtEl>
+                                        <p:attrNameLst>
+                                          <p:attrName>style.visibility</p:attrName>
+                                        </p:attrNameLst>
+                                      </p:cBhvr>
+                                      <p:to>
+                                        <p:strVal val="visible"/>
+                                      </p:to>
+                                    </p:set>
+                                  </p:childTnLst>
+                                </p:cTn>
+                              </p:par>
+                              <p:par>
+                                <p:cTn id="23" presetID="1" presetClass="entr" presetSubtype="0" fill="hold" nodeType="withEffect">
+                                  <p:stCondLst>
+                                    <p:cond delay="0"/>
+                                  </p:stCondLst>
+                                  <p:childTnLst>
+                                    <p:set>
+                                      <p:cBhvr>
+                                        <p:cTn id="24" dur="1" fill="hold">
+                                          <p:stCondLst>
+                                            <p:cond delay="0"/>
+                                          </p:stCondLst>
+                                        </p:cTn>
+                                        <p:tgtEl>
+                                          <p:spTgt spid="4">
+                                            <p:txEl>
+                                              <p:pRg st="8" end="8"/>
+                                            </p:txEl>
+                                          </p:spTgt>
+                                        </p:tgtEl>
+                                        <p:attrNameLst>
+                                          <p:attrName>style.visibility</p:attrName>
+                                        </p:attrNameLst>
+                                      </p:cBhvr>
+                                      <p:to>
+                                        <p:strVal val="visible"/>
+                                      </p:to>
+                                    </p:set>
+                                  </p:childTnLst>
+                                </p:cTn>
+                              </p:par>
+                              <p:par>
+                                <p:cTn id="25" presetID="1" presetClass="entr" presetSubtype="0" fill="hold" nodeType="withEffect">
+                                  <p:stCondLst>
+                                    <p:cond delay="0"/>
+                                  </p:stCondLst>
+                                  <p:childTnLst>
+                                    <p:set>
+                                      <p:cBhvr>
+                                        <p:cTn id="26" dur="1" fill="hold">
+                                          <p:stCondLst>
+                                            <p:cond delay="0"/>
+                                          </p:stCondLst>
+                                        </p:cTn>
+                                        <p:tgtEl>
+                                          <p:spTgt spid="4">
+                                            <p:txEl>
+                                              <p:pRg st="9" end="9"/>
+                                            </p:txEl>
+                                          </p:spTgt>
+                                        </p:tgtEl>
+                                        <p:attrNameLst>
+                                          <p:attrName>style.visibility</p:attrName>
+                                        </p:attrNameLst>
+                                      </p:cBhvr>
+                                      <p:to>
+                                        <p:strVal val="visible"/>
+                                      </p:to>
+                                    </p:set>
+                                  </p:childTnLst>
+                                </p:cTn>
+                              </p:par>
+                            </p:childTnLst>
+                          </p:cTn>
+                        </p:par>
+                      </p:childTnLst>
+                    </p:cTn>
+                  </p:par>
+                  <p:par>
+                    <p:cTn id="27" fill="hold">
+                      <p:stCondLst>
+                        <p:cond delay="indefinite"/>
+                      </p:stCondLst>
+                      <p:childTnLst>
+                        <p:par>
+                          <p:cTn id="28" fill="hold">
+                            <p:stCondLst>
+                              <p:cond delay="0"/>
+                            </p:stCondLst>
+                            <p:childTnLst>
+                              <p:par>
+                                <p:cTn id="29" presetID="1" presetClass="entr" presetSubtype="0" fill="hold" nodeType="clickEffect">
+                                  <p:stCondLst>
+                                    <p:cond delay="0"/>
+                                  </p:stCondLst>
+                                  <p:childTnLst>
+                                    <p:set>
+                                      <p:cBhvr>
+                                        <p:cTn id="30" dur="1" fill="hold">
+                                          <p:stCondLst>
+                                            <p:cond delay="0"/>
+                                          </p:stCondLst>
+                                        </p:cTn>
+                                        <p:tgtEl>
+                                          <p:spTgt spid="4">
+                                            <p:txEl>
+                                              <p:pRg st="11" end="11"/>
+                                            </p:txEl>
+                                          </p:spTgt>
+                                        </p:tgtEl>
+                                        <p:attrNameLst>
+                                          <p:attrName>style.visibility</p:attrName>
+                                        </p:attrNameLst>
+                                      </p:cBhvr>
+                                      <p:to>
+                                        <p:strVal val="visible"/>
+                                      </p:to>
+                                    </p:set>
+                                  </p:childTnLst>
+                                </p:cTn>
+                              </p:par>
+                              <p:par>
+                                <p:cTn id="31" presetID="1" presetClass="entr" presetSubtype="0" fill="hold" nodeType="withEffect">
+                                  <p:stCondLst>
+                                    <p:cond delay="0"/>
+                                  </p:stCondLst>
+                                  <p:childTnLst>
+                                    <p:set>
+                                      <p:cBhvr>
+                                        <p:cTn id="32" dur="1" fill="hold">
+                                          <p:stCondLst>
+                                            <p:cond delay="0"/>
+                                          </p:stCondLst>
+                                        </p:cTn>
+                                        <p:tgtEl>
+                                          <p:spTgt spid="4">
+                                            <p:txEl>
+                                              <p:pRg st="12" end="12"/>
+                                            </p:txEl>
+                                          </p:spTgt>
+                                        </p:tgtEl>
+                                        <p:attrNameLst>
+                                          <p:attrName>style.visibility</p:attrName>
+                                        </p:attrNameLst>
+                                      </p:cBhvr>
+                                      <p:to>
+                                        <p:strVal val="visible"/>
+                                      </p:to>
+                                    </p:set>
+                                  </p:childTnLst>
+                                </p:cTn>
+                              </p:par>
+                              <p:par>
+                                <p:cTn id="33" presetID="1" presetClass="entr" presetSubtype="0" fill="hold" nodeType="withEffect">
+                                  <p:stCondLst>
+                                    <p:cond delay="0"/>
+                                  </p:stCondLst>
+                                  <p:childTnLst>
+                                    <p:set>
+                                      <p:cBhvr>
+                                        <p:cTn id="34" dur="1" fill="hold">
+                                          <p:stCondLst>
+                                            <p:cond delay="0"/>
+                                          </p:stCondLst>
+                                        </p:cTn>
+                                        <p:tgtEl>
+                                          <p:spTgt spid="4">
+                                            <p:txEl>
+                                              <p:pRg st="13" end="13"/>
+                                            </p:txEl>
+                                          </p:spTgt>
+                                        </p:tgtEl>
+                                        <p:attrNameLst>
+                                          <p:attrName>style.visibility</p:attrName>
+                                        </p:attrNameLst>
+                                      </p:cBhvr>
+                                      <p:to>
+                                        <p:strVal val="visible"/>
+                                      </p:to>
+                                    </p:set>
+                                  </p:childTnLst>
+                                </p:cTn>
+                              </p:par>
+                            </p:childTnLst>
+                          </p:cTn>
+                        </p:par>
+                      </p:childTnLst>
+                    </p:cTn>
+                  </p:par>
+                </p:childTnLst>
+              </p:cTn>
+              <p:prevCondLst>
+                <p:cond evt="onPrev" delay="0">
+                  <p:tgtEl>
+                    <p:sldTgt/>
+                  </p:tgtEl>
+                </p:cond>
+              </p:prevCondLst>
+              <p:nextCondLst>
+                <p:cond evt="onNext" delay="0">
+                  <p:tgtEl>
+                    <p:sldTgt/>
+                  </p:tgtEl>
+                </p:cond>
+              </p:nextCondLst>
+            </p:seq>
+          </p:childTnLst>
+        </p:cTn>
+      </p:par>
+    </p:tnLst>
+  </p:timing>
+</p:sld>
+</file>
+
+<file path=ppt/slides/slide11.xml><?xml version="1.0" encoding="utf-8"?>
 <p:sld xmlns:a="http://schemas.openxmlformats.org/drawingml/2006/main" xmlns:r="http://schemas.openxmlformats.org/officeDocument/2006/relationships" xmlns:p="http://schemas.openxmlformats.org/presentationml/2006/main">
   <p:cSld>
     <p:spTree>
@@ -8633,9 +9324,6 @@
               </a:rPr>
               <a:t>Fonction </a:t>
             </a:r>
-            <a:endParaRPr lang="fr-FR" sz="5400" dirty="0" smtClean="0">
-              <a:cs typeface="Courier New" panose="02070309020205020404" pitchFamily="49" charset="0"/>
-            </a:endParaRPr>
           </a:p>
           <a:p>
             <a:pPr lvl="1">
@@ -8652,13 +9340,7 @@
               <a:rPr lang="fr-FR" sz="5400" dirty="0" smtClean="0">
                 <a:cs typeface="Courier New" panose="02070309020205020404" pitchFamily="49" charset="0"/>
               </a:rPr>
-              <a:t>nstance d’une </a:t>
-            </a:r>
-            <a:r>
-              <a:rPr lang="fr-FR" sz="5400" dirty="0" smtClean="0">
-                <a:cs typeface="Courier New" panose="02070309020205020404" pitchFamily="49" charset="0"/>
-              </a:rPr>
-              <a:t>classe </a:t>
+              <a:t>nstance d’une classe </a:t>
             </a:r>
             <a:r>
               <a:rPr lang="fr-FR" sz="5400" dirty="0">
@@ -9090,14 +9772,7 @@
                 <a:latin typeface="Courier New" panose="02070309020205020404" pitchFamily="49" charset="0"/>
                 <a:cs typeface="Courier New" panose="02070309020205020404" pitchFamily="49" charset="0"/>
               </a:rPr>
-              <a:t>(f</a:t>
-            </a:r>
-            <a:r>
-              <a:rPr lang="fr-FR" sz="4800" dirty="0" smtClean="0">
-                <a:latin typeface="Courier New" panose="02070309020205020404" pitchFamily="49" charset="0"/>
-                <a:cs typeface="Courier New" panose="02070309020205020404" pitchFamily="49" charset="0"/>
-              </a:rPr>
-              <a:t>) </a:t>
+              <a:t>(f) </a:t>
             </a:r>
             <a:r>
               <a:rPr lang="fr-FR" sz="4800" dirty="0" smtClean="0">
@@ -10068,14 +10743,7 @@
                   <a:latin typeface="Courier New" panose="02070309020205020404" pitchFamily="49" charset="0"/>
                   <a:cs typeface="Courier New" panose="02070309020205020404" pitchFamily="49" charset="0"/>
                 </a:rPr>
-                <a:t> </a:t>
-              </a:r>
-              <a:r>
-                <a:rPr lang="fr-FR" dirty="0" smtClean="0">
-                  <a:latin typeface="Courier New" panose="02070309020205020404" pitchFamily="49" charset="0"/>
-                  <a:cs typeface="Courier New" panose="02070309020205020404" pitchFamily="49" charset="0"/>
-                </a:rPr>
-                <a:t>= </a:t>
+                <a:t> = </a:t>
               </a:r>
               <a:r>
                 <a:rPr lang="fr-FR" dirty="0" err="1" smtClean="0">
@@ -10328,13 +10996,7 @@
                 <a:rPr lang="fr-FR" sz="3200" dirty="0" smtClean="0">
                   <a:latin typeface="Calibri" panose="020F0502020204030204" pitchFamily="34" charset="0"/>
                 </a:rPr>
-                <a:t> </a:t>
-              </a:r>
-              <a:r>
-                <a:rPr lang="fr-FR" sz="3200" dirty="0" smtClean="0">
-                  <a:latin typeface="Calibri" panose="020F0502020204030204" pitchFamily="34" charset="0"/>
-                </a:rPr>
-                <a:t>n’est plus une fonction, mais une instance de </a:t>
+                <a:t> n’est plus une fonction, mais une instance de </a:t>
               </a:r>
               <a:r>
                 <a:rPr lang="fr-FR" sz="3200" dirty="0" err="1" smtClean="0">
@@ -10365,14 +11027,7 @@
                   <a:latin typeface="Courier New" panose="02070309020205020404" pitchFamily="49" charset="0"/>
                   <a:cs typeface="Courier New" panose="02070309020205020404" pitchFamily="49" charset="0"/>
                 </a:rPr>
-                <a:t>(a</a:t>
-              </a:r>
-              <a:r>
-                <a:rPr lang="fr-FR" sz="3200" dirty="0" smtClean="0">
-                  <a:latin typeface="Courier New" panose="02070309020205020404" pitchFamily="49" charset="0"/>
-                  <a:cs typeface="Courier New" panose="02070309020205020404" pitchFamily="49" charset="0"/>
-                </a:rPr>
-                <a:t>, b) </a:t>
+                <a:t>(a, b) </a:t>
               </a:r>
               <a:r>
                 <a:rPr lang="fr-FR" sz="3200" dirty="0" smtClean="0">
@@ -10576,25 +11231,7 @@
                 <a:rPr lang="fr-FR" sz="3200" dirty="0" smtClean="0">
                   <a:latin typeface="Calibri" panose="020F0502020204030204" pitchFamily="34" charset="0"/>
                 </a:rPr>
-                <a:t>retourne </a:t>
-              </a:r>
-              <a:r>
-                <a:rPr lang="fr-FR" sz="3200" dirty="0" smtClean="0">
-                  <a:latin typeface="Calibri" panose="020F0502020204030204" pitchFamily="34" charset="0"/>
-                </a:rPr>
-                <a:t>la valeur de retour de l’appel de la </a:t>
-              </a:r>
-              <a:r>
-                <a:rPr lang="fr-FR" sz="3200" dirty="0" smtClean="0">
-                  <a:latin typeface="Calibri" panose="020F0502020204030204" pitchFamily="34" charset="0"/>
-                </a:rPr>
-                <a:t>fonction </a:t>
-              </a:r>
-              <a:r>
-                <a:rPr lang="fr-FR" sz="3200" dirty="0" smtClean="0">
-                  <a:latin typeface="Calibri" panose="020F0502020204030204" pitchFamily="34" charset="0"/>
-                </a:rPr>
-                <a:t>originale </a:t>
+                <a:t>retourne la valeur de retour de l’appel de la fonction originale </a:t>
               </a:r>
               <a:r>
                 <a:rPr lang="fr-FR" sz="3200" dirty="0" smtClean="0">

</xml_diff>

<commit_message>
fixed typos improved presentation
</commit_message>
<xml_diff>
--- a/semaine7/CO12AL-W7-VIDEO02-SLIDE01.pptx
+++ b/semaine7/CO12AL-W7-VIDEO02-SLIDE01.pptx
@@ -7202,10 +7202,10 @@
               <a:rPr lang="fr-FR" sz="6000" dirty="0" smtClean="0">
                 <a:latin typeface="Calibri" panose="020F0502020204030204" pitchFamily="34" charset="0"/>
               </a:rPr>
-              <a:t>Un décorateur est une </a:t>
-            </a:r>
-            <a:r>
-              <a:rPr lang="fr-FR" sz="6000" dirty="0" err="1" smtClean="0">
+              <a:t>Un décorateur est un </a:t>
+            </a:r>
+            <a:r>
+              <a:rPr lang="fr-FR" sz="6000" i="1" dirty="0" err="1" smtClean="0">
                 <a:latin typeface="Calibri" panose="020F0502020204030204" pitchFamily="34" charset="0"/>
               </a:rPr>
               <a:t>callable</a:t>
@@ -9810,7 +9810,30 @@
               <a:rPr lang="fr-FR" sz="4800" dirty="0" smtClean="0">
                 <a:cs typeface="Courier New" panose="02070309020205020404" pitchFamily="49" charset="0"/>
               </a:rPr>
-              <a:t>appelle en réalité </a:t>
+              <a:t>appelle </a:t>
+            </a:r>
+            <a:r>
+              <a:rPr lang="fr-FR" sz="4800" dirty="0" smtClean="0">
+                <a:cs typeface="Courier New" panose="02070309020205020404" pitchFamily="49" charset="0"/>
+              </a:rPr>
+              <a:t/>
+            </a:r>
+            <a:br>
+              <a:rPr lang="fr-FR" sz="4800" dirty="0" smtClean="0">
+                <a:cs typeface="Courier New" panose="02070309020205020404" pitchFamily="49" charset="0"/>
+              </a:rPr>
+            </a:br>
+            <a:r>
+              <a:rPr lang="fr-FR" sz="4800" dirty="0" smtClean="0">
+                <a:cs typeface="Courier New" panose="02070309020205020404" pitchFamily="49" charset="0"/>
+              </a:rPr>
+              <a:t>en </a:t>
+            </a:r>
+            <a:r>
+              <a:rPr lang="fr-FR" sz="4800" dirty="0" smtClean="0">
+                <a:cs typeface="Courier New" panose="02070309020205020404" pitchFamily="49" charset="0"/>
+              </a:rPr>
+              <a:t>réalité </a:t>
             </a:r>
             <a:r>
               <a:rPr lang="fr-FR" sz="4800" dirty="0" smtClean="0">
@@ -10628,9 +10651,9 @@
         <p:grpSpPr>
           <a:xfrm>
             <a:off x="2759628" y="4854754"/>
-            <a:ext cx="7639783" cy="1405367"/>
+            <a:ext cx="7639782" cy="1405367"/>
             <a:chOff x="3350602" y="4854756"/>
-            <a:chExt cx="7639783" cy="1405367"/>
+            <a:chExt cx="7639782" cy="1405367"/>
           </a:xfrm>
         </p:grpSpPr>
         <p:sp>
@@ -10641,7 +10664,7 @@
           </p:nvSpPr>
           <p:spPr>
             <a:xfrm>
-              <a:off x="5890847" y="4854756"/>
+              <a:off x="5890846" y="4854756"/>
               <a:ext cx="5099538" cy="1200329"/>
             </a:xfrm>
             <a:prstGeom prst="rect">

</xml_diff>